<commit_message>
typos and small corrections
</commit_message>
<xml_diff>
--- a/Presentation.pptx
+++ b/Presentation.pptx
@@ -5,10 +5,10 @@
     <p:sldMasterId id="2147483673" r:id="rId1"/>
   </p:sldMasterIdLst>
   <p:notesMasterIdLst>
-    <p:notesMasterId r:id="rId16"/>
+    <p:notesMasterId r:id="rId15"/>
   </p:notesMasterIdLst>
   <p:handoutMasterIdLst>
-    <p:handoutMasterId r:id="rId17"/>
+    <p:handoutMasterId r:id="rId16"/>
   </p:handoutMasterIdLst>
   <p:sldIdLst>
     <p:sldId id="257" r:id="rId2"/>
@@ -21,10 +21,9 @@
     <p:sldId id="270" r:id="rId9"/>
     <p:sldId id="271" r:id="rId10"/>
     <p:sldId id="272" r:id="rId11"/>
-    <p:sldId id="273" r:id="rId12"/>
-    <p:sldId id="274" r:id="rId13"/>
-    <p:sldId id="275" r:id="rId14"/>
-    <p:sldId id="265" r:id="rId15"/>
+    <p:sldId id="274" r:id="rId12"/>
+    <p:sldId id="275" r:id="rId13"/>
+    <p:sldId id="265" r:id="rId14"/>
   </p:sldIdLst>
   <p:sldSz cx="12192000" cy="6858000"/>
   <p:notesSz cx="6858000" cy="9144000"/>
@@ -5975,103 +5974,6 @@
         </a:p>
       </dgm:t>
     </dgm:pt>
-    <dgm:pt modelId="{A2E650F6-5859-4304-92EC-AD3E74A92D51}">
-      <dgm:prSet phldrT="[Texte]"/>
-      <dgm:spPr/>
-      <dgm:t>
-        <a:bodyPr/>
-        <a:lstStyle/>
-        <a:p>
-          <a:r>
-            <a:rPr lang="fr-FR" dirty="0"/>
-            <a:t>Pas de </a:t>
-          </a:r>
-          <a:r>
-            <a:rPr lang="fr-FR" dirty="0" err="1"/>
-            <a:t>User_id</a:t>
-          </a:r>
-          <a:r>
-            <a:rPr lang="fr-FR" dirty="0"/>
-            <a:t> </a:t>
-          </a:r>
-        </a:p>
-      </dgm:t>
-    </dgm:pt>
-    <dgm:pt modelId="{626D4FB7-F539-4BD6-A79E-B9FBD46F743E}" type="parTrans" cxnId="{DF33F199-4047-4754-8378-DCCCFAE65E84}">
-      <dgm:prSet/>
-      <dgm:spPr/>
-      <dgm:t>
-        <a:bodyPr/>
-        <a:lstStyle/>
-        <a:p>
-          <a:endParaRPr lang="fr-FR"/>
-        </a:p>
-      </dgm:t>
-    </dgm:pt>
-    <dgm:pt modelId="{2D0C9B82-9273-4843-93E0-76E5D91EBEF2}" type="sibTrans" cxnId="{DF33F199-4047-4754-8378-DCCCFAE65E84}">
-      <dgm:prSet/>
-      <dgm:spPr/>
-      <dgm:t>
-        <a:bodyPr/>
-        <a:lstStyle/>
-        <a:p>
-          <a:endParaRPr lang="fr-FR"/>
-        </a:p>
-      </dgm:t>
-    </dgm:pt>
-    <dgm:pt modelId="{78B56529-23FA-43FB-8FFA-936A30404C3B}">
-      <dgm:prSet phldrT="[Texte]"/>
-      <dgm:spPr/>
-      <dgm:t>
-        <a:bodyPr/>
-        <a:lstStyle/>
-        <a:p>
-          <a:r>
-            <a:rPr lang="en-US" dirty="0"/>
-            <a:t>"Pass a user id in the </a:t>
-          </a:r>
-          <a:r>
-            <a:rPr lang="en-US" dirty="0" err="1"/>
-            <a:t>url</a:t>
-          </a:r>
-          <a:r>
-            <a:rPr lang="en-US" dirty="0"/>
-            <a:t> binding for a </a:t>
-          </a:r>
-          <a:r>
-            <a:rPr lang="en-US" dirty="0" err="1"/>
-            <a:t>recommandation</a:t>
-          </a:r>
-          <a:r>
-            <a:rPr lang="en-US" dirty="0"/>
-            <a:t>"</a:t>
-          </a:r>
-          <a:endParaRPr lang="fr-FR" dirty="0"/>
-        </a:p>
-      </dgm:t>
-    </dgm:pt>
-    <dgm:pt modelId="{A03EACC3-AD48-498E-8212-090D9C8DCAFA}" type="parTrans" cxnId="{A1605CEE-F840-4B95-8C9F-F7957810DDF9}">
-      <dgm:prSet/>
-      <dgm:spPr/>
-      <dgm:t>
-        <a:bodyPr/>
-        <a:lstStyle/>
-        <a:p>
-          <a:endParaRPr lang="fr-FR"/>
-        </a:p>
-      </dgm:t>
-    </dgm:pt>
-    <dgm:pt modelId="{F7178802-96A7-4CCD-9BBB-65D74A7D5B70}" type="sibTrans" cxnId="{A1605CEE-F840-4B95-8C9F-F7957810DDF9}">
-      <dgm:prSet/>
-      <dgm:spPr/>
-      <dgm:t>
-        <a:bodyPr/>
-        <a:lstStyle/>
-        <a:p>
-          <a:endParaRPr lang="fr-FR"/>
-        </a:p>
-      </dgm:t>
-    </dgm:pt>
     <dgm:pt modelId="{11DE1F3D-FA9F-4ABE-8708-FCC335DB847B}">
       <dgm:prSet phldrT="[Texte]"/>
       <dgm:spPr/>
@@ -6325,60 +6227,12 @@
       <dgm:prSet presAssocID="{B17BCACD-321E-41EB-BE16-3F540FF1A5F3}" presName="level2hierChild" presStyleCnt="0"/>
       <dgm:spPr/>
     </dgm:pt>
-    <dgm:pt modelId="{040A419A-1C2A-4950-BC01-CA98B900F5CA}" type="pres">
-      <dgm:prSet presAssocID="{626D4FB7-F539-4BD6-A79E-B9FBD46F743E}" presName="conn2-1" presStyleLbl="parChTrans1D2" presStyleIdx="0" presStyleCnt="3"/>
-      <dgm:spPr/>
-    </dgm:pt>
-    <dgm:pt modelId="{A7D7F88A-08DB-4838-BF59-7C0D22760E68}" type="pres">
-      <dgm:prSet presAssocID="{626D4FB7-F539-4BD6-A79E-B9FBD46F743E}" presName="connTx" presStyleLbl="parChTrans1D2" presStyleIdx="0" presStyleCnt="3"/>
-      <dgm:spPr/>
-    </dgm:pt>
-    <dgm:pt modelId="{E07EC747-B6EA-4619-8DB7-726E5008D54E}" type="pres">
-      <dgm:prSet presAssocID="{A2E650F6-5859-4304-92EC-AD3E74A92D51}" presName="root2" presStyleCnt="0"/>
-      <dgm:spPr/>
-    </dgm:pt>
-    <dgm:pt modelId="{9EFDDC3A-9C33-4737-A0F8-E78154EFF9FC}" type="pres">
-      <dgm:prSet presAssocID="{A2E650F6-5859-4304-92EC-AD3E74A92D51}" presName="LevelTwoTextNode" presStyleLbl="node2" presStyleIdx="0" presStyleCnt="3">
-        <dgm:presLayoutVars>
-          <dgm:chPref val="3"/>
-        </dgm:presLayoutVars>
-      </dgm:prSet>
-      <dgm:spPr/>
-    </dgm:pt>
-    <dgm:pt modelId="{6E886A2C-973D-4493-98C1-94A1C803C120}" type="pres">
-      <dgm:prSet presAssocID="{A2E650F6-5859-4304-92EC-AD3E74A92D51}" presName="level3hierChild" presStyleCnt="0"/>
-      <dgm:spPr/>
-    </dgm:pt>
-    <dgm:pt modelId="{7C48FAAC-D41B-475A-90C8-E8B9B366B145}" type="pres">
-      <dgm:prSet presAssocID="{A03EACC3-AD48-498E-8212-090D9C8DCAFA}" presName="conn2-1" presStyleLbl="parChTrans1D3" presStyleIdx="0" presStyleCnt="3"/>
-      <dgm:spPr/>
-    </dgm:pt>
-    <dgm:pt modelId="{B18F04F0-C28B-4403-BA5D-BEF1C771B840}" type="pres">
-      <dgm:prSet presAssocID="{A03EACC3-AD48-498E-8212-090D9C8DCAFA}" presName="connTx" presStyleLbl="parChTrans1D3" presStyleIdx="0" presStyleCnt="3"/>
-      <dgm:spPr/>
-    </dgm:pt>
-    <dgm:pt modelId="{1D37A7BE-78E1-4399-998E-2E7D62D91C4E}" type="pres">
-      <dgm:prSet presAssocID="{78B56529-23FA-43FB-8FFA-936A30404C3B}" presName="root2" presStyleCnt="0"/>
-      <dgm:spPr/>
-    </dgm:pt>
-    <dgm:pt modelId="{4D8CDD9D-27DF-417B-937A-8E2B55A3BD5D}" type="pres">
-      <dgm:prSet presAssocID="{78B56529-23FA-43FB-8FFA-936A30404C3B}" presName="LevelTwoTextNode" presStyleLbl="node3" presStyleIdx="0" presStyleCnt="3" custScaleX="149263">
-        <dgm:presLayoutVars>
-          <dgm:chPref val="3"/>
-        </dgm:presLayoutVars>
-      </dgm:prSet>
-      <dgm:spPr/>
-    </dgm:pt>
-    <dgm:pt modelId="{08355A85-08A6-408C-9A50-02A67A0BDFD5}" type="pres">
-      <dgm:prSet presAssocID="{78B56529-23FA-43FB-8FFA-936A30404C3B}" presName="level3hierChild" presStyleCnt="0"/>
-      <dgm:spPr/>
-    </dgm:pt>
     <dgm:pt modelId="{8E767A21-1AEE-418C-BE95-F3B9BD27F69F}" type="pres">
-      <dgm:prSet presAssocID="{866C668A-7806-473B-B86A-B2B22774D5B8}" presName="conn2-1" presStyleLbl="parChTrans1D2" presStyleIdx="1" presStyleCnt="3"/>
+      <dgm:prSet presAssocID="{866C668A-7806-473B-B86A-B2B22774D5B8}" presName="conn2-1" presStyleLbl="parChTrans1D2" presStyleIdx="0" presStyleCnt="2"/>
       <dgm:spPr/>
     </dgm:pt>
     <dgm:pt modelId="{9643AF14-A175-4031-B5C7-62BE8255DE86}" type="pres">
-      <dgm:prSet presAssocID="{866C668A-7806-473B-B86A-B2B22774D5B8}" presName="connTx" presStyleLbl="parChTrans1D2" presStyleIdx="1" presStyleCnt="3"/>
+      <dgm:prSet presAssocID="{866C668A-7806-473B-B86A-B2B22774D5B8}" presName="connTx" presStyleLbl="parChTrans1D2" presStyleIdx="0" presStyleCnt="2"/>
       <dgm:spPr/>
     </dgm:pt>
     <dgm:pt modelId="{A09AF32A-22B1-4E1D-9C3E-6AF8B689EDBA}" type="pres">
@@ -6386,7 +6240,7 @@
       <dgm:spPr/>
     </dgm:pt>
     <dgm:pt modelId="{1D913089-5784-48A4-B037-243290CF5CB4}" type="pres">
-      <dgm:prSet presAssocID="{11DE1F3D-FA9F-4ABE-8708-FCC335DB847B}" presName="LevelTwoTextNode" presStyleLbl="node2" presStyleIdx="1" presStyleCnt="3">
+      <dgm:prSet presAssocID="{11DE1F3D-FA9F-4ABE-8708-FCC335DB847B}" presName="LevelTwoTextNode" presStyleLbl="node2" presStyleIdx="0" presStyleCnt="2">
         <dgm:presLayoutVars>
           <dgm:chPref val="3"/>
         </dgm:presLayoutVars>
@@ -6398,11 +6252,11 @@
       <dgm:spPr/>
     </dgm:pt>
     <dgm:pt modelId="{8EC9FF1C-E0D1-4028-A445-FDA446EF5287}" type="pres">
-      <dgm:prSet presAssocID="{22CE341F-C606-4C19-9135-A754B3158E72}" presName="conn2-1" presStyleLbl="parChTrans1D3" presStyleIdx="1" presStyleCnt="3"/>
+      <dgm:prSet presAssocID="{22CE341F-C606-4C19-9135-A754B3158E72}" presName="conn2-1" presStyleLbl="parChTrans1D3" presStyleIdx="0" presStyleCnt="2"/>
       <dgm:spPr/>
     </dgm:pt>
     <dgm:pt modelId="{74070C04-BFB8-4329-966A-5CF314743D1C}" type="pres">
-      <dgm:prSet presAssocID="{22CE341F-C606-4C19-9135-A754B3158E72}" presName="connTx" presStyleLbl="parChTrans1D3" presStyleIdx="1" presStyleCnt="3"/>
+      <dgm:prSet presAssocID="{22CE341F-C606-4C19-9135-A754B3158E72}" presName="connTx" presStyleLbl="parChTrans1D3" presStyleIdx="0" presStyleCnt="2"/>
       <dgm:spPr/>
     </dgm:pt>
     <dgm:pt modelId="{4C7B0EB1-F2AF-4FC9-9C72-A6D36B7D0246}" type="pres">
@@ -6410,7 +6264,7 @@
       <dgm:spPr/>
     </dgm:pt>
     <dgm:pt modelId="{2706A1E3-9957-4987-9586-8A0B5C4BF415}" type="pres">
-      <dgm:prSet presAssocID="{1A3A2FEE-EEE9-4B07-9292-366612F46E2D}" presName="LevelTwoTextNode" presStyleLbl="node3" presStyleIdx="1" presStyleCnt="3">
+      <dgm:prSet presAssocID="{1A3A2FEE-EEE9-4B07-9292-366612F46E2D}" presName="LevelTwoTextNode" presStyleLbl="node3" presStyleIdx="0" presStyleCnt="2">
         <dgm:presLayoutVars>
           <dgm:chPref val="3"/>
         </dgm:presLayoutVars>
@@ -6422,11 +6276,11 @@
       <dgm:spPr/>
     </dgm:pt>
     <dgm:pt modelId="{9398E14D-D410-4C6A-9AFD-097EE0EC9E32}" type="pres">
-      <dgm:prSet presAssocID="{70BA94F8-08A0-47D1-928B-3B1AB71C33A1}" presName="conn2-1" presStyleLbl="parChTrans1D2" presStyleIdx="2" presStyleCnt="3"/>
+      <dgm:prSet presAssocID="{70BA94F8-08A0-47D1-928B-3B1AB71C33A1}" presName="conn2-1" presStyleLbl="parChTrans1D2" presStyleIdx="1" presStyleCnt="2"/>
       <dgm:spPr/>
     </dgm:pt>
     <dgm:pt modelId="{D782CC0E-32A0-49A1-A6C1-502AC7D2D683}" type="pres">
-      <dgm:prSet presAssocID="{70BA94F8-08A0-47D1-928B-3B1AB71C33A1}" presName="connTx" presStyleLbl="parChTrans1D2" presStyleIdx="2" presStyleCnt="3"/>
+      <dgm:prSet presAssocID="{70BA94F8-08A0-47D1-928B-3B1AB71C33A1}" presName="connTx" presStyleLbl="parChTrans1D2" presStyleIdx="1" presStyleCnt="2"/>
       <dgm:spPr/>
     </dgm:pt>
     <dgm:pt modelId="{61456BE9-043E-4DD4-8301-5BD684BCF7C9}" type="pres">
@@ -6434,7 +6288,7 @@
       <dgm:spPr/>
     </dgm:pt>
     <dgm:pt modelId="{82D92555-7C08-4884-9C8C-111E81E7EA14}" type="pres">
-      <dgm:prSet presAssocID="{2ADF4E08-C153-429C-8C80-AFC32FDFEB51}" presName="LevelTwoTextNode" presStyleLbl="node2" presStyleIdx="2" presStyleCnt="3">
+      <dgm:prSet presAssocID="{2ADF4E08-C153-429C-8C80-AFC32FDFEB51}" presName="LevelTwoTextNode" presStyleLbl="node2" presStyleIdx="1" presStyleCnt="2">
         <dgm:presLayoutVars>
           <dgm:chPref val="3"/>
         </dgm:presLayoutVars>
@@ -6446,11 +6300,11 @@
       <dgm:spPr/>
     </dgm:pt>
     <dgm:pt modelId="{EDF46D59-E019-4A32-A2D6-D34E0D5F2A4B}" type="pres">
-      <dgm:prSet presAssocID="{ADD9DDB9-4079-4091-B0CE-94DBC35804BD}" presName="conn2-1" presStyleLbl="parChTrans1D3" presStyleIdx="2" presStyleCnt="3"/>
+      <dgm:prSet presAssocID="{ADD9DDB9-4079-4091-B0CE-94DBC35804BD}" presName="conn2-1" presStyleLbl="parChTrans1D3" presStyleIdx="1" presStyleCnt="2"/>
       <dgm:spPr/>
     </dgm:pt>
     <dgm:pt modelId="{52480BDC-BCC2-4E72-8A16-830D75BE6925}" type="pres">
-      <dgm:prSet presAssocID="{ADD9DDB9-4079-4091-B0CE-94DBC35804BD}" presName="connTx" presStyleLbl="parChTrans1D3" presStyleIdx="2" presStyleCnt="3"/>
+      <dgm:prSet presAssocID="{ADD9DDB9-4079-4091-B0CE-94DBC35804BD}" presName="connTx" presStyleLbl="parChTrans1D3" presStyleIdx="1" presStyleCnt="2"/>
       <dgm:spPr/>
     </dgm:pt>
     <dgm:pt modelId="{71F8B75A-B02C-4C07-93ED-26BEF97501DE}" type="pres">
@@ -6458,7 +6312,7 @@
       <dgm:spPr/>
     </dgm:pt>
     <dgm:pt modelId="{14076E2C-A4F4-435C-80A7-00AFB08184C4}" type="pres">
-      <dgm:prSet presAssocID="{374638FB-772E-4904-A5D8-1438DD3D4FAD}" presName="LevelTwoTextNode" presStyleLbl="node3" presStyleIdx="2" presStyleCnt="3">
+      <dgm:prSet presAssocID="{374638FB-772E-4904-A5D8-1438DD3D4FAD}" presName="LevelTwoTextNode" presStyleLbl="node3" presStyleIdx="1" presStyleCnt="2">
         <dgm:presLayoutVars>
           <dgm:chPref val="3"/>
         </dgm:presLayoutVars>
@@ -6519,7 +6373,6 @@
     </dgm:pt>
   </dgm:ptLst>
   <dgm:cxnLst>
-    <dgm:cxn modelId="{8FEBE105-AF9D-4665-93D9-2025C892FACA}" type="presOf" srcId="{A03EACC3-AD48-498E-8212-090D9C8DCAFA}" destId="{7C48FAAC-D41B-475A-90C8-E8B9B366B145}" srcOrd="0" destOrd="0" presId="urn:microsoft.com/office/officeart/2005/8/layout/hierarchy2"/>
     <dgm:cxn modelId="{81CA4006-2B43-4152-9316-91CE7BF8DB93}" type="presOf" srcId="{4642A1CE-BF88-446B-95B5-955F92AF0C8B}" destId="{E213C009-4372-4080-8469-68A10FDA870E}" srcOrd="0" destOrd="0" presId="urn:microsoft.com/office/officeart/2005/8/layout/hierarchy2"/>
     <dgm:cxn modelId="{0536721C-3384-4015-A485-53CF845A918C}" type="presOf" srcId="{827DA510-8E07-4E7B-ABD8-3284B920BEAA}" destId="{3A971ACE-1EA9-431C-B8FE-D7D2B071D505}" srcOrd="0" destOrd="0" presId="urn:microsoft.com/office/officeart/2005/8/layout/hierarchy2"/>
     <dgm:cxn modelId="{CAD05827-8C06-4E7C-81E9-6E15F068E2DF}" type="presOf" srcId="{22CE341F-C606-4C19-9135-A754B3158E72}" destId="{74070C04-BFB8-4329-966A-5CF314743D1C}" srcOrd="1" destOrd="0" presId="urn:microsoft.com/office/officeart/2005/8/layout/hierarchy2"/>
@@ -6527,49 +6380,32 @@
     <dgm:cxn modelId="{3E18A130-B220-43F5-83F9-6216363F074B}" type="presOf" srcId="{827DA510-8E07-4E7B-ABD8-3284B920BEAA}" destId="{E75EF25C-D1B0-4E5F-A885-5BABF7112FBD}" srcOrd="1" destOrd="0" presId="urn:microsoft.com/office/officeart/2005/8/layout/hierarchy2"/>
     <dgm:cxn modelId="{86A17431-9648-4240-9EA5-2F5EB05FDEB3}" srcId="{4642A1CE-BF88-446B-95B5-955F92AF0C8B}" destId="{35E98702-7B2D-4F82-A8B3-5F0F1CB65145}" srcOrd="0" destOrd="0" parTransId="{11A98B92-DADE-41D5-81B0-62A8DE55A5E7}" sibTransId="{1285BD57-B5EE-4FDE-88C6-6719592FD3F5}"/>
     <dgm:cxn modelId="{2D2B9D33-7B10-4F0D-98F2-92F2DD7E4F0D}" type="presOf" srcId="{C7409653-E6BB-4FE1-AAEF-D3807961D9E6}" destId="{DDCE1521-E989-47F1-A5B2-5B86F9670A2B}" srcOrd="0" destOrd="0" presId="urn:microsoft.com/office/officeart/2005/8/layout/hierarchy2"/>
-    <dgm:cxn modelId="{5F382437-A75C-4512-8F93-1DFC33CE1AB8}" type="presOf" srcId="{626D4FB7-F539-4BD6-A79E-B9FBD46F743E}" destId="{040A419A-1C2A-4950-BC01-CA98B900F5CA}" srcOrd="0" destOrd="0" presId="urn:microsoft.com/office/officeart/2005/8/layout/hierarchy2"/>
     <dgm:cxn modelId="{61906B38-3656-4610-AB73-171A62C54944}" srcId="{374638FB-772E-4904-A5D8-1438DD3D4FAD}" destId="{4642A1CE-BF88-446B-95B5-955F92AF0C8B}" srcOrd="0" destOrd="0" parTransId="{827DA510-8E07-4E7B-ABD8-3284B920BEAA}" sibTransId="{706A9C72-E9D4-4392-B799-E6669B210535}"/>
     <dgm:cxn modelId="{6602563E-6721-433A-936F-95E9F3AD50D9}" type="presOf" srcId="{35E98702-7B2D-4F82-A8B3-5F0F1CB65145}" destId="{0D1B3BE1-EC11-422A-8081-1802C51E682B}" srcOrd="0" destOrd="0" presId="urn:microsoft.com/office/officeart/2005/8/layout/hierarchy2"/>
     <dgm:cxn modelId="{E2E35E3F-35CE-40F2-9D71-B1CE7C2D1F0D}" type="presOf" srcId="{11A98B92-DADE-41D5-81B0-62A8DE55A5E7}" destId="{425C817F-4036-46C4-AB4C-AC70236F57DA}" srcOrd="1" destOrd="0" presId="urn:microsoft.com/office/officeart/2005/8/layout/hierarchy2"/>
     <dgm:cxn modelId="{E223185C-6D3F-4549-BFA1-32CFE85DE84E}" type="presOf" srcId="{ADD9DDB9-4079-4091-B0CE-94DBC35804BD}" destId="{EDF46D59-E019-4A32-A2D6-D34E0D5F2A4B}" srcOrd="0" destOrd="0" presId="urn:microsoft.com/office/officeart/2005/8/layout/hierarchy2"/>
-    <dgm:cxn modelId="{7BBA0645-0F0F-4F85-8D91-9D996BCCFE6A}" type="presOf" srcId="{78B56529-23FA-43FB-8FFA-936A30404C3B}" destId="{4D8CDD9D-27DF-417B-937A-8E2B55A3BD5D}" srcOrd="0" destOrd="0" presId="urn:microsoft.com/office/officeart/2005/8/layout/hierarchy2"/>
     <dgm:cxn modelId="{DC722F68-9C66-4020-A630-519852A9DC70}" srcId="{C7409653-E6BB-4FE1-AAEF-D3807961D9E6}" destId="{B17BCACD-321E-41EB-BE16-3F540FF1A5F3}" srcOrd="0" destOrd="0" parTransId="{F45FBA97-57C8-42BE-B854-5A1CC9D9F544}" sibTransId="{03B976D7-8CCA-47AF-952A-6C15C2527646}"/>
     <dgm:cxn modelId="{C1DACC6A-05F6-4FD0-BEA1-D89BCDA2F42A}" type="presOf" srcId="{2ADF4E08-C153-429C-8C80-AFC32FDFEB51}" destId="{82D92555-7C08-4884-9C8C-111E81E7EA14}" srcOrd="0" destOrd="0" presId="urn:microsoft.com/office/officeart/2005/8/layout/hierarchy2"/>
     <dgm:cxn modelId="{B08D7676-3EF2-46DD-B852-66C539B8A191}" type="presOf" srcId="{1A3A2FEE-EEE9-4B07-9292-366612F46E2D}" destId="{2706A1E3-9957-4987-9586-8A0B5C4BF415}" srcOrd="0" destOrd="0" presId="urn:microsoft.com/office/officeart/2005/8/layout/hierarchy2"/>
     <dgm:cxn modelId="{0411E576-3397-464D-8876-1EDD50513FE1}" type="presOf" srcId="{70BA94F8-08A0-47D1-928B-3B1AB71C33A1}" destId="{9398E14D-D410-4C6A-9AFD-097EE0EC9E32}" srcOrd="0" destOrd="0" presId="urn:microsoft.com/office/officeart/2005/8/layout/hierarchy2"/>
     <dgm:cxn modelId="{8936FA78-4099-4807-946C-5092D334D416}" type="presOf" srcId="{22CE341F-C606-4C19-9135-A754B3158E72}" destId="{8EC9FF1C-E0D1-4028-A445-FDA446EF5287}" srcOrd="0" destOrd="0" presId="urn:microsoft.com/office/officeart/2005/8/layout/hierarchy2"/>
     <dgm:cxn modelId="{9D81FC86-D642-4CD1-971F-EA020846B8E6}" srcId="{2ADF4E08-C153-429C-8C80-AFC32FDFEB51}" destId="{374638FB-772E-4904-A5D8-1438DD3D4FAD}" srcOrd="0" destOrd="0" parTransId="{ADD9DDB9-4079-4091-B0CE-94DBC35804BD}" sibTransId="{3B9B607F-CF9A-469C-8677-347FBCE21D28}"/>
-    <dgm:cxn modelId="{4F1FBE88-97CF-42BD-9741-1ABD07EAFF2B}" srcId="{B17BCACD-321E-41EB-BE16-3F540FF1A5F3}" destId="{11DE1F3D-FA9F-4ABE-8708-FCC335DB847B}" srcOrd="1" destOrd="0" parTransId="{866C668A-7806-473B-B86A-B2B22774D5B8}" sibTransId="{0A32980B-BB2B-4CDE-AC9E-A3C72C42DFF3}"/>
+    <dgm:cxn modelId="{4F1FBE88-97CF-42BD-9741-1ABD07EAFF2B}" srcId="{B17BCACD-321E-41EB-BE16-3F540FF1A5F3}" destId="{11DE1F3D-FA9F-4ABE-8708-FCC335DB847B}" srcOrd="0" destOrd="0" parTransId="{866C668A-7806-473B-B86A-B2B22774D5B8}" sibTransId="{0A32980B-BB2B-4CDE-AC9E-A3C72C42DFF3}"/>
     <dgm:cxn modelId="{0673B98F-AF48-4558-AFCD-ED3E308390CA}" srcId="{11DE1F3D-FA9F-4ABE-8708-FCC335DB847B}" destId="{1A3A2FEE-EEE9-4B07-9292-366612F46E2D}" srcOrd="0" destOrd="0" parTransId="{22CE341F-C606-4C19-9135-A754B3158E72}" sibTransId="{A1FF84D4-F1D2-49C0-8F49-7A0EC4E88A1A}"/>
-    <dgm:cxn modelId="{DF33F199-4047-4754-8378-DCCCFAE65E84}" srcId="{B17BCACD-321E-41EB-BE16-3F540FF1A5F3}" destId="{A2E650F6-5859-4304-92EC-AD3E74A92D51}" srcOrd="0" destOrd="0" parTransId="{626D4FB7-F539-4BD6-A79E-B9FBD46F743E}" sibTransId="{2D0C9B82-9273-4843-93E0-76E5D91EBEF2}"/>
     <dgm:cxn modelId="{A54E349A-0267-460C-8398-0EA2940E383E}" type="presOf" srcId="{866C668A-7806-473B-B86A-B2B22774D5B8}" destId="{9643AF14-A175-4031-B5C7-62BE8255DE86}" srcOrd="1" destOrd="0" presId="urn:microsoft.com/office/officeart/2005/8/layout/hierarchy2"/>
     <dgm:cxn modelId="{4649BFB3-F88F-4A7C-8357-5D1A0082116E}" type="presOf" srcId="{374638FB-772E-4904-A5D8-1438DD3D4FAD}" destId="{14076E2C-A4F4-435C-80A7-00AFB08184C4}" srcOrd="0" destOrd="0" presId="urn:microsoft.com/office/officeart/2005/8/layout/hierarchy2"/>
     <dgm:cxn modelId="{236070BF-2536-482E-B5EE-657CB438A6B3}" type="presOf" srcId="{866C668A-7806-473B-B86A-B2B22774D5B8}" destId="{8E767A21-1AEE-418C-BE95-F3B9BD27F69F}" srcOrd="0" destOrd="0" presId="urn:microsoft.com/office/officeart/2005/8/layout/hierarchy2"/>
     <dgm:cxn modelId="{6C05A3C4-EA31-4CFC-A71A-6D5B702D7E1A}" type="presOf" srcId="{70BA94F8-08A0-47D1-928B-3B1AB71C33A1}" destId="{D782CC0E-32A0-49A1-A6C1-502AC7D2D683}" srcOrd="1" destOrd="0" presId="urn:microsoft.com/office/officeart/2005/8/layout/hierarchy2"/>
-    <dgm:cxn modelId="{82F3B7C7-85E5-410C-82F0-9EA53E782046}" type="presOf" srcId="{626D4FB7-F539-4BD6-A79E-B9FBD46F743E}" destId="{A7D7F88A-08DB-4838-BF59-7C0D22760E68}" srcOrd="1" destOrd="0" presId="urn:microsoft.com/office/officeart/2005/8/layout/hierarchy2"/>
-    <dgm:cxn modelId="{248AEBCA-FCA2-4E4B-8F60-FE91F47FBF9E}" srcId="{B17BCACD-321E-41EB-BE16-3F540FF1A5F3}" destId="{2ADF4E08-C153-429C-8C80-AFC32FDFEB51}" srcOrd="2" destOrd="0" parTransId="{70BA94F8-08A0-47D1-928B-3B1AB71C33A1}" sibTransId="{49DB7A4D-5CFA-45DF-8CDE-5455ADF6A882}"/>
+    <dgm:cxn modelId="{248AEBCA-FCA2-4E4B-8F60-FE91F47FBF9E}" srcId="{B17BCACD-321E-41EB-BE16-3F540FF1A5F3}" destId="{2ADF4E08-C153-429C-8C80-AFC32FDFEB51}" srcOrd="1" destOrd="0" parTransId="{70BA94F8-08A0-47D1-928B-3B1AB71C33A1}" sibTransId="{49DB7A4D-5CFA-45DF-8CDE-5455ADF6A882}"/>
     <dgm:cxn modelId="{66DFAADC-C0D2-4BE8-8A53-CB8BD03217A2}" type="presOf" srcId="{B17BCACD-321E-41EB-BE16-3F540FF1A5F3}" destId="{19DEEBA7-D2D3-4482-9B74-71AD86BEC26C}" srcOrd="0" destOrd="0" presId="urn:microsoft.com/office/officeart/2005/8/layout/hierarchy2"/>
     <dgm:cxn modelId="{4A4134EA-A3D7-4C1B-ACDC-46AA9917BCDD}" type="presOf" srcId="{11A98B92-DADE-41D5-81B0-62A8DE55A5E7}" destId="{F3362474-2E77-4A19-B2E4-9EC3357D46B5}" srcOrd="0" destOrd="0" presId="urn:microsoft.com/office/officeart/2005/8/layout/hierarchy2"/>
     <dgm:cxn modelId="{F7F556ED-F1E7-4E68-8CC7-F9AD6F6C43D2}" type="presOf" srcId="{ADD9DDB9-4079-4091-B0CE-94DBC35804BD}" destId="{52480BDC-BCC2-4E72-8A16-830D75BE6925}" srcOrd="1" destOrd="0" presId="urn:microsoft.com/office/officeart/2005/8/layout/hierarchy2"/>
-    <dgm:cxn modelId="{A1605CEE-F840-4B95-8C9F-F7957810DDF9}" srcId="{A2E650F6-5859-4304-92EC-AD3E74A92D51}" destId="{78B56529-23FA-43FB-8FFA-936A30404C3B}" srcOrd="0" destOrd="0" parTransId="{A03EACC3-AD48-498E-8212-090D9C8DCAFA}" sibTransId="{F7178802-96A7-4CCD-9BBB-65D74A7D5B70}"/>
-    <dgm:cxn modelId="{C2414CF8-9B43-43CC-A8E6-E2C4979C2FB8}" type="presOf" srcId="{A2E650F6-5859-4304-92EC-AD3E74A92D51}" destId="{9EFDDC3A-9C33-4737-A0F8-E78154EFF9FC}" srcOrd="0" destOrd="0" presId="urn:microsoft.com/office/officeart/2005/8/layout/hierarchy2"/>
-    <dgm:cxn modelId="{DF8EDBFD-D387-4E7B-9DEB-CBD4A6037895}" type="presOf" srcId="{A03EACC3-AD48-498E-8212-090D9C8DCAFA}" destId="{B18F04F0-C28B-4403-BA5D-BEF1C771B840}" srcOrd="1" destOrd="0" presId="urn:microsoft.com/office/officeart/2005/8/layout/hierarchy2"/>
     <dgm:cxn modelId="{C2E7FC2B-CC55-43B6-9070-66C3E0B3685D}" type="presParOf" srcId="{DDCE1521-E989-47F1-A5B2-5B86F9670A2B}" destId="{58A2B6E5-0DE2-44B8-81B0-F96536AB3456}" srcOrd="0" destOrd="0" presId="urn:microsoft.com/office/officeart/2005/8/layout/hierarchy2"/>
     <dgm:cxn modelId="{A4ACDC6C-C092-4B4F-A57F-2FDBC69E78D5}" type="presParOf" srcId="{58A2B6E5-0DE2-44B8-81B0-F96536AB3456}" destId="{19DEEBA7-D2D3-4482-9B74-71AD86BEC26C}" srcOrd="0" destOrd="0" presId="urn:microsoft.com/office/officeart/2005/8/layout/hierarchy2"/>
     <dgm:cxn modelId="{F8DCE309-A728-4B8E-8BD2-4F25E53C2001}" type="presParOf" srcId="{58A2B6E5-0DE2-44B8-81B0-F96536AB3456}" destId="{84E9CF47-E706-4B92-B3AF-D24A6C21167E}" srcOrd="1" destOrd="0" presId="urn:microsoft.com/office/officeart/2005/8/layout/hierarchy2"/>
-    <dgm:cxn modelId="{A5B8AAE5-4217-4281-AA20-0E2C70301670}" type="presParOf" srcId="{84E9CF47-E706-4B92-B3AF-D24A6C21167E}" destId="{040A419A-1C2A-4950-BC01-CA98B900F5CA}" srcOrd="0" destOrd="0" presId="urn:microsoft.com/office/officeart/2005/8/layout/hierarchy2"/>
-    <dgm:cxn modelId="{C370B09B-D69D-4E31-8E74-BF7F747BA9B4}" type="presParOf" srcId="{040A419A-1C2A-4950-BC01-CA98B900F5CA}" destId="{A7D7F88A-08DB-4838-BF59-7C0D22760E68}" srcOrd="0" destOrd="0" presId="urn:microsoft.com/office/officeart/2005/8/layout/hierarchy2"/>
-    <dgm:cxn modelId="{DEBBFACA-A1C5-4C41-89B8-EAA92AEAE4E4}" type="presParOf" srcId="{84E9CF47-E706-4B92-B3AF-D24A6C21167E}" destId="{E07EC747-B6EA-4619-8DB7-726E5008D54E}" srcOrd="1" destOrd="0" presId="urn:microsoft.com/office/officeart/2005/8/layout/hierarchy2"/>
-    <dgm:cxn modelId="{17D10CF3-5710-4DDC-977F-82C2059764CD}" type="presParOf" srcId="{E07EC747-B6EA-4619-8DB7-726E5008D54E}" destId="{9EFDDC3A-9C33-4737-A0F8-E78154EFF9FC}" srcOrd="0" destOrd="0" presId="urn:microsoft.com/office/officeart/2005/8/layout/hierarchy2"/>
-    <dgm:cxn modelId="{B546AF46-A492-40FE-83A7-52F8B88AF42D}" type="presParOf" srcId="{E07EC747-B6EA-4619-8DB7-726E5008D54E}" destId="{6E886A2C-973D-4493-98C1-94A1C803C120}" srcOrd="1" destOrd="0" presId="urn:microsoft.com/office/officeart/2005/8/layout/hierarchy2"/>
-    <dgm:cxn modelId="{ED6971D1-3155-4754-8A4C-C544E750D77F}" type="presParOf" srcId="{6E886A2C-973D-4493-98C1-94A1C803C120}" destId="{7C48FAAC-D41B-475A-90C8-E8B9B366B145}" srcOrd="0" destOrd="0" presId="urn:microsoft.com/office/officeart/2005/8/layout/hierarchy2"/>
-    <dgm:cxn modelId="{ED402D9B-67E0-45E7-A527-C489E28B3A29}" type="presParOf" srcId="{7C48FAAC-D41B-475A-90C8-E8B9B366B145}" destId="{B18F04F0-C28B-4403-BA5D-BEF1C771B840}" srcOrd="0" destOrd="0" presId="urn:microsoft.com/office/officeart/2005/8/layout/hierarchy2"/>
-    <dgm:cxn modelId="{9EFF0A49-B2B8-4C49-899F-9FD1AD35F7F0}" type="presParOf" srcId="{6E886A2C-973D-4493-98C1-94A1C803C120}" destId="{1D37A7BE-78E1-4399-998E-2E7D62D91C4E}" srcOrd="1" destOrd="0" presId="urn:microsoft.com/office/officeart/2005/8/layout/hierarchy2"/>
-    <dgm:cxn modelId="{7A19E52D-8CE8-4357-ADCD-9949053D9A72}" type="presParOf" srcId="{1D37A7BE-78E1-4399-998E-2E7D62D91C4E}" destId="{4D8CDD9D-27DF-417B-937A-8E2B55A3BD5D}" srcOrd="0" destOrd="0" presId="urn:microsoft.com/office/officeart/2005/8/layout/hierarchy2"/>
-    <dgm:cxn modelId="{22E68024-A9B0-4F6F-8B03-CC858CB7182B}" type="presParOf" srcId="{1D37A7BE-78E1-4399-998E-2E7D62D91C4E}" destId="{08355A85-08A6-408C-9A50-02A67A0BDFD5}" srcOrd="1" destOrd="0" presId="urn:microsoft.com/office/officeart/2005/8/layout/hierarchy2"/>
-    <dgm:cxn modelId="{45EC86EF-A698-469F-8FDE-C5A86F52CEC7}" type="presParOf" srcId="{84E9CF47-E706-4B92-B3AF-D24A6C21167E}" destId="{8E767A21-1AEE-418C-BE95-F3B9BD27F69F}" srcOrd="2" destOrd="0" presId="urn:microsoft.com/office/officeart/2005/8/layout/hierarchy2"/>
+    <dgm:cxn modelId="{45EC86EF-A698-469F-8FDE-C5A86F52CEC7}" type="presParOf" srcId="{84E9CF47-E706-4B92-B3AF-D24A6C21167E}" destId="{8E767A21-1AEE-418C-BE95-F3B9BD27F69F}" srcOrd="0" destOrd="0" presId="urn:microsoft.com/office/officeart/2005/8/layout/hierarchy2"/>
     <dgm:cxn modelId="{EDF98A92-9D01-4805-8F40-C0824E3FFC3F}" type="presParOf" srcId="{8E767A21-1AEE-418C-BE95-F3B9BD27F69F}" destId="{9643AF14-A175-4031-B5C7-62BE8255DE86}" srcOrd="0" destOrd="0" presId="urn:microsoft.com/office/officeart/2005/8/layout/hierarchy2"/>
-    <dgm:cxn modelId="{00557B1E-B874-47F1-AF41-44CE467F4F63}" type="presParOf" srcId="{84E9CF47-E706-4B92-B3AF-D24A6C21167E}" destId="{A09AF32A-22B1-4E1D-9C3E-6AF8B689EDBA}" srcOrd="3" destOrd="0" presId="urn:microsoft.com/office/officeart/2005/8/layout/hierarchy2"/>
+    <dgm:cxn modelId="{00557B1E-B874-47F1-AF41-44CE467F4F63}" type="presParOf" srcId="{84E9CF47-E706-4B92-B3AF-D24A6C21167E}" destId="{A09AF32A-22B1-4E1D-9C3E-6AF8B689EDBA}" srcOrd="1" destOrd="0" presId="urn:microsoft.com/office/officeart/2005/8/layout/hierarchy2"/>
     <dgm:cxn modelId="{0B3E2364-FF13-4611-931B-68D58D85B635}" type="presParOf" srcId="{A09AF32A-22B1-4E1D-9C3E-6AF8B689EDBA}" destId="{1D913089-5784-48A4-B037-243290CF5CB4}" srcOrd="0" destOrd="0" presId="urn:microsoft.com/office/officeart/2005/8/layout/hierarchy2"/>
     <dgm:cxn modelId="{C1FAE591-8887-4FDD-AD6B-9E2CD2220565}" type="presParOf" srcId="{A09AF32A-22B1-4E1D-9C3E-6AF8B689EDBA}" destId="{3F4E1CD6-B737-4987-8573-D5E73296DEFD}" srcOrd="1" destOrd="0" presId="urn:microsoft.com/office/officeart/2005/8/layout/hierarchy2"/>
     <dgm:cxn modelId="{52C0E1F1-F277-4125-82E5-82BC170AEDC7}" type="presParOf" srcId="{3F4E1CD6-B737-4987-8573-D5E73296DEFD}" destId="{8EC9FF1C-E0D1-4028-A445-FDA446EF5287}" srcOrd="0" destOrd="0" presId="urn:microsoft.com/office/officeart/2005/8/layout/hierarchy2"/>
@@ -6577,9 +6413,9 @@
     <dgm:cxn modelId="{45D455F8-D307-425A-AF06-7ABA765F0E9D}" type="presParOf" srcId="{3F4E1CD6-B737-4987-8573-D5E73296DEFD}" destId="{4C7B0EB1-F2AF-4FC9-9C72-A6D36B7D0246}" srcOrd="1" destOrd="0" presId="urn:microsoft.com/office/officeart/2005/8/layout/hierarchy2"/>
     <dgm:cxn modelId="{795831D0-07E0-415B-AFD4-54F500D517C2}" type="presParOf" srcId="{4C7B0EB1-F2AF-4FC9-9C72-A6D36B7D0246}" destId="{2706A1E3-9957-4987-9586-8A0B5C4BF415}" srcOrd="0" destOrd="0" presId="urn:microsoft.com/office/officeart/2005/8/layout/hierarchy2"/>
     <dgm:cxn modelId="{BDC3E4CC-AAFB-482F-9E65-5ADAB078DD2B}" type="presParOf" srcId="{4C7B0EB1-F2AF-4FC9-9C72-A6D36B7D0246}" destId="{9B6B7585-2171-4D1F-A5B4-BF853230A91B}" srcOrd="1" destOrd="0" presId="urn:microsoft.com/office/officeart/2005/8/layout/hierarchy2"/>
-    <dgm:cxn modelId="{0823AA5F-CFB1-4542-872B-587BDC63149C}" type="presParOf" srcId="{84E9CF47-E706-4B92-B3AF-D24A6C21167E}" destId="{9398E14D-D410-4C6A-9AFD-097EE0EC9E32}" srcOrd="4" destOrd="0" presId="urn:microsoft.com/office/officeart/2005/8/layout/hierarchy2"/>
+    <dgm:cxn modelId="{0823AA5F-CFB1-4542-872B-587BDC63149C}" type="presParOf" srcId="{84E9CF47-E706-4B92-B3AF-D24A6C21167E}" destId="{9398E14D-D410-4C6A-9AFD-097EE0EC9E32}" srcOrd="2" destOrd="0" presId="urn:microsoft.com/office/officeart/2005/8/layout/hierarchy2"/>
     <dgm:cxn modelId="{40ABF7CD-7888-4A99-A90D-B52E1E78B316}" type="presParOf" srcId="{9398E14D-D410-4C6A-9AFD-097EE0EC9E32}" destId="{D782CC0E-32A0-49A1-A6C1-502AC7D2D683}" srcOrd="0" destOrd="0" presId="urn:microsoft.com/office/officeart/2005/8/layout/hierarchy2"/>
-    <dgm:cxn modelId="{498729B2-94E9-4883-9CB4-7312D747D343}" type="presParOf" srcId="{84E9CF47-E706-4B92-B3AF-D24A6C21167E}" destId="{61456BE9-043E-4DD4-8301-5BD684BCF7C9}" srcOrd="5" destOrd="0" presId="urn:microsoft.com/office/officeart/2005/8/layout/hierarchy2"/>
+    <dgm:cxn modelId="{498729B2-94E9-4883-9CB4-7312D747D343}" type="presParOf" srcId="{84E9CF47-E706-4B92-B3AF-D24A6C21167E}" destId="{61456BE9-043E-4DD4-8301-5BD684BCF7C9}" srcOrd="3" destOrd="0" presId="urn:microsoft.com/office/officeart/2005/8/layout/hierarchy2"/>
     <dgm:cxn modelId="{1D32A15B-7C0E-48BF-846C-D2126CE1A7F4}" type="presParOf" srcId="{61456BE9-043E-4DD4-8301-5BD684BCF7C9}" destId="{82D92555-7C08-4884-9C8C-111E81E7EA14}" srcOrd="0" destOrd="0" presId="urn:microsoft.com/office/officeart/2005/8/layout/hierarchy2"/>
     <dgm:cxn modelId="{B2A931AE-802B-4EA5-9621-00E927479192}" type="presParOf" srcId="{61456BE9-043E-4DD4-8301-5BD684BCF7C9}" destId="{9183F6A0-54C4-417F-9F09-89A5F10156B3}" srcOrd="1" destOrd="0" presId="urn:microsoft.com/office/officeart/2005/8/layout/hierarchy2"/>
     <dgm:cxn modelId="{890D1919-CD8B-4380-87A5-B87AFDDC29E7}" type="presParOf" srcId="{9183F6A0-54C4-417F-9F09-89A5F10156B3}" destId="{EDF46D59-E019-4A32-A2D6-D34E0D5F2A4B}" srcOrd="0" destOrd="0" presId="urn:microsoft.com/office/officeart/2005/8/layout/hierarchy2"/>
@@ -8715,15 +8551,15 @@
         <a:ext cx="1573496" cy="763010"/>
       </dsp:txXfrm>
     </dsp:sp>
-    <dsp:sp modelId="{040A419A-1C2A-4950-BC01-CA98B900F5CA}">
+    <dsp:sp modelId="{8E767A21-1AEE-418C-BE95-F3B9BD27F69F}">
       <dsp:nvSpPr>
         <dsp:cNvPr id="0" name=""/>
         <dsp:cNvSpPr/>
       </dsp:nvSpPr>
       <dsp:spPr>
-        <a:xfrm rot="18289469">
-          <a:off x="1381137" y="2188913"/>
-          <a:ext cx="1135404" cy="27333"/>
+        <a:xfrm rot="19457599">
+          <a:off x="1549592" y="2421928"/>
+          <a:ext cx="798493" cy="27333"/>
         </a:xfrm>
         <a:custGeom>
           <a:avLst/>
@@ -8737,7 +8573,7 @@
                 <a:pt x="0" y="13666"/>
               </a:moveTo>
               <a:lnTo>
-                <a:pt x="1135404" y="13666"/>
+                <a:pt x="798493" y="13666"/>
               </a:lnTo>
             </a:path>
           </a:pathLst>
@@ -8791,353 +8627,8 @@
         </a:p>
       </dsp:txBody>
       <dsp:txXfrm>
-        <a:off x="1920454" y="2174195"/>
-        <a:ext cx="56770" cy="56770"/>
-      </dsp:txXfrm>
-    </dsp:sp>
-    <dsp:sp modelId="{9EFDDC3A-9C33-4737-A0F8-E78154EFF9FC}">
-      <dsp:nvSpPr>
-        <dsp:cNvPr id="0" name=""/>
-        <dsp:cNvSpPr/>
-      </dsp:nvSpPr>
-      <dsp:spPr>
-        <a:xfrm>
-          <a:off x="2273033" y="1331308"/>
-          <a:ext cx="1620972" cy="810486"/>
-        </a:xfrm>
-        <a:prstGeom prst="roundRect">
-          <a:avLst>
-            <a:gd name="adj" fmla="val 10000"/>
-          </a:avLst>
-        </a:prstGeom>
-        <a:solidFill>
-          <a:schemeClr val="accent2">
-            <a:tint val="99000"/>
-            <a:hueOff val="0"/>
-            <a:satOff val="0"/>
-            <a:lumOff val="0"/>
-            <a:alphaOff val="0"/>
-          </a:schemeClr>
-        </a:solidFill>
-        <a:ln w="12700" cap="flat" cmpd="sng" algn="ctr">
-          <a:solidFill>
-            <a:schemeClr val="lt1">
-              <a:hueOff val="0"/>
-              <a:satOff val="0"/>
-              <a:lumOff val="0"/>
-              <a:alphaOff val="0"/>
-            </a:schemeClr>
-          </a:solidFill>
-          <a:prstDash val="solid"/>
-        </a:ln>
-        <a:effectLst/>
-      </dsp:spPr>
-      <dsp:style>
-        <a:lnRef idx="2">
-          <a:scrgbClr r="0" g="0" b="0"/>
-        </a:lnRef>
-        <a:fillRef idx="1">
-          <a:scrgbClr r="0" g="0" b="0"/>
-        </a:fillRef>
-        <a:effectRef idx="0">
-          <a:scrgbClr r="0" g="0" b="0"/>
-        </a:effectRef>
-        <a:fontRef idx="minor">
-          <a:schemeClr val="lt1"/>
-        </a:fontRef>
-      </dsp:style>
-      <dsp:txBody>
-        <a:bodyPr spcFirstLastPara="0" vert="horz" wrap="square" lIns="8255" tIns="8255" rIns="8255" bIns="8255" numCol="1" spcCol="1270" anchor="ctr" anchorCtr="0">
-          <a:noAutofit/>
-        </a:bodyPr>
-        <a:lstStyle/>
-        <a:p>
-          <a:pPr marL="0" lvl="0" indent="0" algn="ctr" defTabSz="577850">
-            <a:lnSpc>
-              <a:spcPct val="90000"/>
-            </a:lnSpc>
-            <a:spcBef>
-              <a:spcPct val="0"/>
-            </a:spcBef>
-            <a:spcAft>
-              <a:spcPct val="35000"/>
-            </a:spcAft>
-            <a:buNone/>
-          </a:pPr>
-          <a:r>
-            <a:rPr lang="fr-FR" sz="1300" kern="1200" dirty="0"/>
-            <a:t>Pas de </a:t>
-          </a:r>
-          <a:r>
-            <a:rPr lang="fr-FR" sz="1300" kern="1200" dirty="0" err="1"/>
-            <a:t>User_id</a:t>
-          </a:r>
-          <a:r>
-            <a:rPr lang="fr-FR" sz="1300" kern="1200" dirty="0"/>
-            <a:t> </a:t>
-          </a:r>
-        </a:p>
-      </dsp:txBody>
-      <dsp:txXfrm>
-        <a:off x="2296771" y="1355046"/>
-        <a:ext cx="1573496" cy="763010"/>
-      </dsp:txXfrm>
-    </dsp:sp>
-    <dsp:sp modelId="{7C48FAAC-D41B-475A-90C8-E8B9B366B145}">
-      <dsp:nvSpPr>
-        <dsp:cNvPr id="0" name=""/>
-        <dsp:cNvSpPr/>
-      </dsp:nvSpPr>
-      <dsp:spPr>
-        <a:xfrm>
-          <a:off x="3894006" y="1722884"/>
-          <a:ext cx="648388" cy="27333"/>
-        </a:xfrm>
-        <a:custGeom>
-          <a:avLst/>
-          <a:gdLst/>
-          <a:ahLst/>
-          <a:cxnLst/>
-          <a:rect l="0" t="0" r="0" b="0"/>
-          <a:pathLst>
-            <a:path>
-              <a:moveTo>
-                <a:pt x="0" y="13666"/>
-              </a:moveTo>
-              <a:lnTo>
-                <a:pt x="648388" y="13666"/>
-              </a:lnTo>
-            </a:path>
-          </a:pathLst>
-        </a:custGeom>
-        <a:noFill/>
-        <a:ln w="12700" cap="flat" cmpd="sng" algn="ctr">
-          <a:solidFill>
-            <a:schemeClr val="accent2">
-              <a:tint val="80000"/>
-              <a:hueOff val="0"/>
-              <a:satOff val="0"/>
-              <a:lumOff val="0"/>
-              <a:alphaOff val="0"/>
-            </a:schemeClr>
-          </a:solidFill>
-          <a:prstDash val="solid"/>
-        </a:ln>
-        <a:effectLst/>
-      </dsp:spPr>
-      <dsp:style>
-        <a:lnRef idx="2">
-          <a:scrgbClr r="0" g="0" b="0"/>
-        </a:lnRef>
-        <a:fillRef idx="0">
-          <a:scrgbClr r="0" g="0" b="0"/>
-        </a:fillRef>
-        <a:effectRef idx="0">
-          <a:scrgbClr r="0" g="0" b="0"/>
-        </a:effectRef>
-        <a:fontRef idx="minor"/>
-      </dsp:style>
-      <dsp:txBody>
-        <a:bodyPr spcFirstLastPara="0" vert="horz" wrap="square" lIns="12700" tIns="0" rIns="12700" bIns="0" numCol="1" spcCol="1270" anchor="ctr" anchorCtr="0">
-          <a:noAutofit/>
-        </a:bodyPr>
-        <a:lstStyle/>
-        <a:p>
-          <a:pPr marL="0" lvl="0" indent="0" algn="ctr" defTabSz="222250">
-            <a:lnSpc>
-              <a:spcPct val="90000"/>
-            </a:lnSpc>
-            <a:spcBef>
-              <a:spcPct val="0"/>
-            </a:spcBef>
-            <a:spcAft>
-              <a:spcPct val="35000"/>
-            </a:spcAft>
-            <a:buNone/>
-          </a:pPr>
-          <a:endParaRPr lang="fr-FR" sz="500" kern="1200"/>
-        </a:p>
-      </dsp:txBody>
-      <dsp:txXfrm>
-        <a:off x="4201991" y="1720341"/>
-        <a:ext cx="32419" cy="32419"/>
-      </dsp:txXfrm>
-    </dsp:sp>
-    <dsp:sp modelId="{4D8CDD9D-27DF-417B-937A-8E2B55A3BD5D}">
-      <dsp:nvSpPr>
-        <dsp:cNvPr id="0" name=""/>
-        <dsp:cNvSpPr/>
-      </dsp:nvSpPr>
-      <dsp:spPr>
-        <a:xfrm>
-          <a:off x="4542395" y="1331308"/>
-          <a:ext cx="2419512" cy="810486"/>
-        </a:xfrm>
-        <a:prstGeom prst="roundRect">
-          <a:avLst>
-            <a:gd name="adj" fmla="val 10000"/>
-          </a:avLst>
-        </a:prstGeom>
-        <a:solidFill>
-          <a:schemeClr val="accent2">
-            <a:tint val="80000"/>
-            <a:hueOff val="0"/>
-            <a:satOff val="0"/>
-            <a:lumOff val="0"/>
-            <a:alphaOff val="0"/>
-          </a:schemeClr>
-        </a:solidFill>
-        <a:ln w="12700" cap="flat" cmpd="sng" algn="ctr">
-          <a:solidFill>
-            <a:schemeClr val="lt1">
-              <a:hueOff val="0"/>
-              <a:satOff val="0"/>
-              <a:lumOff val="0"/>
-              <a:alphaOff val="0"/>
-            </a:schemeClr>
-          </a:solidFill>
-          <a:prstDash val="solid"/>
-        </a:ln>
-        <a:effectLst/>
-      </dsp:spPr>
-      <dsp:style>
-        <a:lnRef idx="2">
-          <a:scrgbClr r="0" g="0" b="0"/>
-        </a:lnRef>
-        <a:fillRef idx="1">
-          <a:scrgbClr r="0" g="0" b="0"/>
-        </a:fillRef>
-        <a:effectRef idx="0">
-          <a:scrgbClr r="0" g="0" b="0"/>
-        </a:effectRef>
-        <a:fontRef idx="minor">
-          <a:schemeClr val="lt1"/>
-        </a:fontRef>
-      </dsp:style>
-      <dsp:txBody>
-        <a:bodyPr spcFirstLastPara="0" vert="horz" wrap="square" lIns="8255" tIns="8255" rIns="8255" bIns="8255" numCol="1" spcCol="1270" anchor="ctr" anchorCtr="0">
-          <a:noAutofit/>
-        </a:bodyPr>
-        <a:lstStyle/>
-        <a:p>
-          <a:pPr marL="0" lvl="0" indent="0" algn="ctr" defTabSz="577850">
-            <a:lnSpc>
-              <a:spcPct val="90000"/>
-            </a:lnSpc>
-            <a:spcBef>
-              <a:spcPct val="0"/>
-            </a:spcBef>
-            <a:spcAft>
-              <a:spcPct val="35000"/>
-            </a:spcAft>
-            <a:buNone/>
-          </a:pPr>
-          <a:r>
-            <a:rPr lang="en-US" sz="1300" kern="1200" dirty="0"/>
-            <a:t>"Pass a user id in the </a:t>
-          </a:r>
-          <a:r>
-            <a:rPr lang="en-US" sz="1300" kern="1200" dirty="0" err="1"/>
-            <a:t>url</a:t>
-          </a:r>
-          <a:r>
-            <a:rPr lang="en-US" sz="1300" kern="1200" dirty="0"/>
-            <a:t> binding for a </a:t>
-          </a:r>
-          <a:r>
-            <a:rPr lang="en-US" sz="1300" kern="1200" dirty="0" err="1"/>
-            <a:t>recommandation</a:t>
-          </a:r>
-          <a:r>
-            <a:rPr lang="en-US" sz="1300" kern="1200" dirty="0"/>
-            <a:t>"</a:t>
-          </a:r>
-          <a:endParaRPr lang="fr-FR" sz="1300" kern="1200" dirty="0"/>
-        </a:p>
-      </dsp:txBody>
-      <dsp:txXfrm>
-        <a:off x="4566133" y="1355046"/>
-        <a:ext cx="2372036" cy="763010"/>
-      </dsp:txXfrm>
-    </dsp:sp>
-    <dsp:sp modelId="{8E767A21-1AEE-418C-BE95-F3B9BD27F69F}">
-      <dsp:nvSpPr>
-        <dsp:cNvPr id="0" name=""/>
-        <dsp:cNvSpPr/>
-      </dsp:nvSpPr>
-      <dsp:spPr>
-        <a:xfrm>
-          <a:off x="1624644" y="2654943"/>
-          <a:ext cx="648388" cy="27333"/>
-        </a:xfrm>
-        <a:custGeom>
-          <a:avLst/>
-          <a:gdLst/>
-          <a:ahLst/>
-          <a:cxnLst/>
-          <a:rect l="0" t="0" r="0" b="0"/>
-          <a:pathLst>
-            <a:path>
-              <a:moveTo>
-                <a:pt x="0" y="13666"/>
-              </a:moveTo>
-              <a:lnTo>
-                <a:pt x="648388" y="13666"/>
-              </a:lnTo>
-            </a:path>
-          </a:pathLst>
-        </a:custGeom>
-        <a:noFill/>
-        <a:ln w="12700" cap="flat" cmpd="sng" algn="ctr">
-          <a:solidFill>
-            <a:schemeClr val="accent2">
-              <a:tint val="99000"/>
-              <a:hueOff val="0"/>
-              <a:satOff val="0"/>
-              <a:lumOff val="0"/>
-              <a:alphaOff val="0"/>
-            </a:schemeClr>
-          </a:solidFill>
-          <a:prstDash val="solid"/>
-        </a:ln>
-        <a:effectLst/>
-      </dsp:spPr>
-      <dsp:style>
-        <a:lnRef idx="2">
-          <a:scrgbClr r="0" g="0" b="0"/>
-        </a:lnRef>
-        <a:fillRef idx="0">
-          <a:scrgbClr r="0" g="0" b="0"/>
-        </a:fillRef>
-        <a:effectRef idx="0">
-          <a:scrgbClr r="0" g="0" b="0"/>
-        </a:effectRef>
-        <a:fontRef idx="minor"/>
-      </dsp:style>
-      <dsp:txBody>
-        <a:bodyPr spcFirstLastPara="0" vert="horz" wrap="square" lIns="12700" tIns="0" rIns="12700" bIns="0" numCol="1" spcCol="1270" anchor="ctr" anchorCtr="0">
-          <a:noAutofit/>
-        </a:bodyPr>
-        <a:lstStyle/>
-        <a:p>
-          <a:pPr marL="0" lvl="0" indent="0" algn="ctr" defTabSz="222250">
-            <a:lnSpc>
-              <a:spcPct val="90000"/>
-            </a:lnSpc>
-            <a:spcBef>
-              <a:spcPct val="0"/>
-            </a:spcBef>
-            <a:spcAft>
-              <a:spcPct val="35000"/>
-            </a:spcAft>
-            <a:buNone/>
-          </a:pPr>
-          <a:endParaRPr lang="fr-FR" sz="500" kern="1200"/>
-        </a:p>
-      </dsp:txBody>
-      <dsp:txXfrm>
-        <a:off x="1932629" y="2652400"/>
-        <a:ext cx="32419" cy="32419"/>
+        <a:off x="1928877" y="2415633"/>
+        <a:ext cx="39924" cy="39924"/>
       </dsp:txXfrm>
     </dsp:sp>
     <dsp:sp modelId="{1D913089-5784-48A4-B037-243290CF5CB4}">
@@ -9147,7 +8638,7 @@
       </dsp:nvSpPr>
       <dsp:spPr>
         <a:xfrm>
-          <a:off x="2273033" y="2263367"/>
+          <a:off x="2273033" y="1797337"/>
           <a:ext cx="1620972" cy="810486"/>
         </a:xfrm>
         <a:prstGeom prst="roundRect">
@@ -9220,7 +8711,7 @@
         </a:p>
       </dsp:txBody>
       <dsp:txXfrm>
-        <a:off x="2296771" y="2287105"/>
+        <a:off x="2296771" y="1821075"/>
         <a:ext cx="1573496" cy="763010"/>
       </dsp:txXfrm>
     </dsp:sp>
@@ -9231,7 +8722,7 @@
       </dsp:nvSpPr>
       <dsp:spPr>
         <a:xfrm>
-          <a:off x="3894006" y="2654943"/>
+          <a:off x="3894006" y="2188913"/>
           <a:ext cx="648388" cy="27333"/>
         </a:xfrm>
         <a:custGeom>
@@ -9300,7 +8791,7 @@
         </a:p>
       </dsp:txBody>
       <dsp:txXfrm>
-        <a:off x="4201991" y="2652400"/>
+        <a:off x="4201991" y="2186371"/>
         <a:ext cx="32419" cy="32419"/>
       </dsp:txXfrm>
     </dsp:sp>
@@ -9311,7 +8802,7 @@
       </dsp:nvSpPr>
       <dsp:spPr>
         <a:xfrm>
-          <a:off x="4542395" y="2263367"/>
+          <a:off x="4542395" y="1797337"/>
           <a:ext cx="1620972" cy="810486"/>
         </a:xfrm>
         <a:prstGeom prst="roundRect">
@@ -9381,7 +8872,7 @@
         </a:p>
       </dsp:txBody>
       <dsp:txXfrm>
-        <a:off x="4566133" y="2287105"/>
+        <a:off x="4566133" y="1821075"/>
         <a:ext cx="1573496" cy="763010"/>
       </dsp:txXfrm>
     </dsp:sp>
@@ -9391,9 +8882,9 @@
         <dsp:cNvSpPr/>
       </dsp:nvSpPr>
       <dsp:spPr>
-        <a:xfrm rot="3310531">
-          <a:off x="1381137" y="3120973"/>
-          <a:ext cx="1135404" cy="27333"/>
+        <a:xfrm rot="2142401">
+          <a:off x="1549592" y="2887958"/>
+          <a:ext cx="798493" cy="27333"/>
         </a:xfrm>
         <a:custGeom>
           <a:avLst/>
@@ -9407,7 +8898,7 @@
                 <a:pt x="0" y="13666"/>
               </a:moveTo>
               <a:lnTo>
-                <a:pt x="1135404" y="13666"/>
+                <a:pt x="798493" y="13666"/>
               </a:lnTo>
             </a:path>
           </a:pathLst>
@@ -9461,8 +8952,8 @@
         </a:p>
       </dsp:txBody>
       <dsp:txXfrm>
-        <a:off x="1920454" y="3106254"/>
-        <a:ext cx="56770" cy="56770"/>
+        <a:off x="1928877" y="2881662"/>
+        <a:ext cx="39924" cy="39924"/>
       </dsp:txXfrm>
     </dsp:sp>
     <dsp:sp modelId="{82D92555-7C08-4884-9C8C-111E81E7EA14}">
@@ -9472,7 +8963,7 @@
       </dsp:nvSpPr>
       <dsp:spPr>
         <a:xfrm>
-          <a:off x="2273033" y="3195426"/>
+          <a:off x="2273033" y="2729396"/>
           <a:ext cx="1620972" cy="810486"/>
         </a:xfrm>
         <a:prstGeom prst="roundRect">
@@ -9545,7 +9036,7 @@
         </a:p>
       </dsp:txBody>
       <dsp:txXfrm>
-        <a:off x="2296771" y="3219164"/>
+        <a:off x="2296771" y="2753134"/>
         <a:ext cx="1573496" cy="763010"/>
       </dsp:txXfrm>
     </dsp:sp>
@@ -9556,7 +9047,7 @@
       </dsp:nvSpPr>
       <dsp:spPr>
         <a:xfrm>
-          <a:off x="3894006" y="3587002"/>
+          <a:off x="3894006" y="3120973"/>
           <a:ext cx="648388" cy="27333"/>
         </a:xfrm>
         <a:custGeom>
@@ -9625,7 +9116,7 @@
         </a:p>
       </dsp:txBody>
       <dsp:txXfrm>
-        <a:off x="4201991" y="3584459"/>
+        <a:off x="4201991" y="3118430"/>
         <a:ext cx="32419" cy="32419"/>
       </dsp:txXfrm>
     </dsp:sp>
@@ -9636,7 +9127,7 @@
       </dsp:nvSpPr>
       <dsp:spPr>
         <a:xfrm>
-          <a:off x="4542395" y="3195426"/>
+          <a:off x="4542395" y="2729396"/>
           <a:ext cx="1620972" cy="810486"/>
         </a:xfrm>
         <a:prstGeom prst="roundRect">
@@ -9705,7 +9196,7 @@
         </a:p>
       </dsp:txBody>
       <dsp:txXfrm>
-        <a:off x="4566133" y="3219164"/>
+        <a:off x="4566133" y="2753134"/>
         <a:ext cx="1573496" cy="763010"/>
       </dsp:txXfrm>
     </dsp:sp>
@@ -9716,7 +9207,7 @@
       </dsp:nvSpPr>
       <dsp:spPr>
         <a:xfrm>
-          <a:off x="6163367" y="3587002"/>
+          <a:off x="6163367" y="3120973"/>
           <a:ext cx="648388" cy="27333"/>
         </a:xfrm>
         <a:custGeom>
@@ -9785,7 +9276,7 @@
         </a:p>
       </dsp:txBody>
       <dsp:txXfrm>
-        <a:off x="6471352" y="3584459"/>
+        <a:off x="6471352" y="3118430"/>
         <a:ext cx="32419" cy="32419"/>
       </dsp:txXfrm>
     </dsp:sp>
@@ -9796,7 +9287,7 @@
       </dsp:nvSpPr>
       <dsp:spPr>
         <a:xfrm>
-          <a:off x="6811756" y="3195426"/>
+          <a:off x="6811756" y="2729396"/>
           <a:ext cx="1620972" cy="810486"/>
         </a:xfrm>
         <a:prstGeom prst="roundRect">
@@ -9865,7 +9356,7 @@
         </a:p>
       </dsp:txBody>
       <dsp:txXfrm>
-        <a:off x="6835494" y="3219164"/>
+        <a:off x="6835494" y="2753134"/>
         <a:ext cx="1573496" cy="763010"/>
       </dsp:txXfrm>
     </dsp:sp>
@@ -9876,7 +9367,7 @@
       </dsp:nvSpPr>
       <dsp:spPr>
         <a:xfrm>
-          <a:off x="8432729" y="3587002"/>
+          <a:off x="8432729" y="3120973"/>
           <a:ext cx="648388" cy="27333"/>
         </a:xfrm>
         <a:custGeom>
@@ -9945,7 +9436,7 @@
         </a:p>
       </dsp:txBody>
       <dsp:txXfrm>
-        <a:off x="8740713" y="3584459"/>
+        <a:off x="8740713" y="3118430"/>
         <a:ext cx="32419" cy="32419"/>
       </dsp:txXfrm>
     </dsp:sp>
@@ -9956,7 +9447,7 @@
       </dsp:nvSpPr>
       <dsp:spPr>
         <a:xfrm>
-          <a:off x="9081118" y="3195426"/>
+          <a:off x="9081118" y="2729396"/>
           <a:ext cx="1620972" cy="810486"/>
         </a:xfrm>
         <a:prstGeom prst="roundRect">
@@ -10025,7 +9516,7 @@
         </a:p>
       </dsp:txBody>
       <dsp:txXfrm>
-        <a:off x="9104856" y="3219164"/>
+        <a:off x="9104856" y="2753134"/>
         <a:ext cx="1573496" cy="763010"/>
       </dsp:txXfrm>
     </dsp:sp>
@@ -17466,7 +16957,7 @@
             <a:pPr rtl="0"/>
             <a:fld id="{D541C455-0541-42CB-85F2-EF2EB726E407}" type="datetime1">
               <a:rPr lang="fr-FR" smtClean="0"/>
-              <a:t>29/11/2022</a:t>
+              <a:t>30/11/2022</a:t>
             </a:fld>
             <a:endParaRPr lang="en-US" dirty="0"/>
           </a:p>
@@ -17636,7 +17127,7 @@
             <a:pPr rtl="0"/>
             <a:fld id="{139F4AB6-716B-4E95-AAD2-DB349D9AC9BA}" type="datetime1">
               <a:rPr lang="fr-FR" smtClean="0"/>
-              <a:t>29/11/2022</a:t>
+              <a:t>30/11/2022</a:t>
             </a:fld>
             <a:endParaRPr lang="en-US"/>
           </a:p>
@@ -18381,7 +17872,7 @@
             <a:pPr rtl="0"/>
             <a:fld id="{43B6331D-8BD5-4AF5-97EE-8FB3C79FE924}" type="datetime1">
               <a:rPr lang="fr-FR" smtClean="0"/>
-              <a:t>29/11/2022</a:t>
+              <a:t>30/11/2022</a:t>
             </a:fld>
             <a:endParaRPr lang="en-US" dirty="0"/>
           </a:p>
@@ -18587,7 +18078,7 @@
             <a:pPr rtl="0"/>
             <a:fld id="{C09D1B91-EF9C-42FB-BBE2-597FDE1B14D7}" type="datetime1">
               <a:rPr lang="fr-FR" smtClean="0"/>
-              <a:t>29/11/2022</a:t>
+              <a:t>30/11/2022</a:t>
             </a:fld>
             <a:endParaRPr lang="en-US"/>
           </a:p>
@@ -18775,7 +18266,7 @@
             <a:pPr rtl="0"/>
             <a:fld id="{2F733226-97BF-4FE9-8F44-80542C0EB53C}" type="datetime1">
               <a:rPr lang="fr-FR" smtClean="0"/>
-              <a:t>29/11/2022</a:t>
+              <a:t>30/11/2022</a:t>
             </a:fld>
             <a:endParaRPr lang="en-US"/>
           </a:p>
@@ -18949,7 +18440,7 @@
             <a:pPr rtl="0"/>
             <a:fld id="{802FE938-1586-4780-B61A-DD3B60BAB93C}" type="datetime1">
               <a:rPr lang="fr-FR" smtClean="0"/>
-              <a:t>29/11/2022</a:t>
+              <a:t>30/11/2022</a:t>
             </a:fld>
             <a:endParaRPr lang="en-US"/>
           </a:p>
@@ -19552,7 +19043,7 @@
             <a:pPr rtl="0"/>
             <a:fld id="{57CE27EF-4081-4F92-AC85-8FD255C3955B}" type="datetime1">
               <a:rPr lang="fr-FR" smtClean="0"/>
-              <a:t>29/11/2022</a:t>
+              <a:t>30/11/2022</a:t>
             </a:fld>
             <a:endParaRPr lang="en-US" dirty="0"/>
           </a:p>
@@ -19876,7 +19367,7 @@
             <a:pPr rtl="0"/>
             <a:fld id="{22E52E25-1182-4E86-836C-7D703787597C}" type="datetime1">
               <a:rPr lang="fr-FR" smtClean="0"/>
-              <a:t>29/11/2022</a:t>
+              <a:t>30/11/2022</a:t>
             </a:fld>
             <a:endParaRPr lang="en-US"/>
           </a:p>
@@ -20317,7 +19808,7 @@
             <a:pPr rtl="0"/>
             <a:fld id="{007B49E2-AD49-4B10-A213-CF194D4A25A3}" type="datetime1">
               <a:rPr lang="fr-FR" smtClean="0"/>
-              <a:t>29/11/2022</a:t>
+              <a:t>30/11/2022</a:t>
             </a:fld>
             <a:endParaRPr lang="en-US"/>
           </a:p>
@@ -20439,7 +19930,7 @@
             <a:pPr rtl="0"/>
             <a:fld id="{25FB4F25-64BB-460E-8192-B4AC51BA66FC}" type="datetime1">
               <a:rPr lang="fr-FR" smtClean="0"/>
-              <a:t>29/11/2022</a:t>
+              <a:t>30/11/2022</a:t>
             </a:fld>
             <a:endParaRPr lang="en-US"/>
           </a:p>
@@ -20537,7 +20028,7 @@
             <a:pPr rtl="0"/>
             <a:fld id="{2BD66AC7-6890-4F0E-B000-A39D822B7C00}" type="datetime1">
               <a:rPr lang="fr-FR" smtClean="0"/>
-              <a:t>29/11/2022</a:t>
+              <a:t>30/11/2022</a:t>
             </a:fld>
             <a:endParaRPr lang="en-US"/>
           </a:p>
@@ -20958,7 +20449,7 @@
             <a:pPr rtl="0"/>
             <a:fld id="{F7B0F5FB-B743-44F1-84BA-99C248DB6023}" type="datetime1">
               <a:rPr lang="fr-FR" smtClean="0"/>
-              <a:t>29/11/2022</a:t>
+              <a:t>30/11/2022</a:t>
             </a:fld>
             <a:endParaRPr lang="en-US"/>
           </a:p>
@@ -21223,7 +20714,7 @@
             <a:pPr rtl="0"/>
             <a:fld id="{C80E5F3D-7A62-48B1-A43E-C6091B37429D}" type="datetime1">
               <a:rPr lang="fr-FR" smtClean="0"/>
-              <a:t>29/11/2022</a:t>
+              <a:t>30/11/2022</a:t>
             </a:fld>
             <a:endParaRPr lang="en-US" dirty="0"/>
           </a:p>
@@ -21743,7 +21234,7 @@
             <a:pPr rtl="0"/>
             <a:fld id="{020D9D58-8984-498B-A4DA-61EAC8A72DD8}" type="datetime1">
               <a:rPr lang="fr-FR" smtClean="0"/>
-              <a:t>29/11/2022</a:t>
+              <a:t>30/11/2022</a:t>
             </a:fld>
             <a:endParaRPr lang="en-US" dirty="0"/>
           </a:p>
@@ -22564,7 +22055,7 @@
                   <a:spcPts val="600"/>
                 </a:spcAft>
               </a:pPr>
-              <a:t>29/11/2022</a:t>
+              <a:t>30/11/2022</a:t>
             </a:fld>
             <a:endParaRPr lang="en-US"/>
           </a:p>
@@ -22697,221 +22188,6 @@
           <a:p>
             <a:pPr algn="ctr" rtl="0"/>
             <a:r>
-              <a:rPr lang="fr" dirty="0"/>
-              <a:t>III. Application Test</a:t>
-            </a:r>
-            <a:br>
-              <a:rPr lang="fr" dirty="0"/>
-            </a:br>
-            <a:r>
-              <a:rPr lang="fr" sz="2800" dirty="0"/>
-              <a:t>API</a:t>
-            </a:r>
-          </a:p>
-        </p:txBody>
-      </p:sp>
-      <p:sp>
-        <p:nvSpPr>
-          <p:cNvPr id="5" name="Espace réservé du contenu 4">
-            <a:extLst>
-              <a:ext uri="{FF2B5EF4-FFF2-40B4-BE49-F238E27FC236}">
-                <a16:creationId xmlns:a16="http://schemas.microsoft.com/office/drawing/2014/main" id="{50D5CC64-09C7-336D-A70D-192E8F3AD672}"/>
-              </a:ext>
-            </a:extLst>
-          </p:cNvPr>
-          <p:cNvSpPr>
-            <a:spLocks noGrp="1"/>
-          </p:cNvSpPr>
-          <p:nvPr>
-            <p:ph idx="1"/>
-          </p:nvPr>
-        </p:nvSpPr>
-        <p:spPr/>
-        <p:txBody>
-          <a:bodyPr/>
-          <a:lstStyle/>
-          <a:p>
-            <a:r>
-              <a:rPr lang="fr-FR" dirty="0"/>
-              <a:t>Pas de </a:t>
-            </a:r>
-            <a:r>
-              <a:rPr lang="fr-FR" dirty="0" err="1"/>
-              <a:t>User_id</a:t>
-            </a:r>
-            <a:r>
-              <a:rPr lang="fr-FR" dirty="0"/>
-              <a:t> :</a:t>
-            </a:r>
-          </a:p>
-          <a:p>
-            <a:pPr lvl="1"/>
-            <a:r>
-              <a:rPr lang="en-US" dirty="0"/>
-              <a:t>"</a:t>
-            </a:r>
-            <a:r>
-              <a:rPr lang="fr-FR" dirty="0"/>
-              <a:t>http </a:t>
-            </a:r>
-            <a:r>
-              <a:rPr lang="fr-FR" dirty="0" err="1"/>
-              <a:t>response</a:t>
-            </a:r>
-            <a:r>
-              <a:rPr lang="fr-FR" dirty="0"/>
-              <a:t> </a:t>
-            </a:r>
-            <a:r>
-              <a:rPr lang="fr-FR" dirty="0" err="1"/>
-              <a:t>successful</a:t>
-            </a:r>
-            <a:r>
-              <a:rPr lang="fr-FR" dirty="0"/>
-              <a:t> : </a:t>
-            </a:r>
-            <a:r>
-              <a:rPr lang="fr-FR" dirty="0" err="1"/>
-              <a:t>please</a:t>
-            </a:r>
-            <a:r>
-              <a:rPr lang="fr-FR" dirty="0"/>
-              <a:t> </a:t>
-            </a:r>
-            <a:r>
-              <a:rPr lang="fr-FR" dirty="0" err="1"/>
-              <a:t>provide</a:t>
-            </a:r>
-            <a:r>
-              <a:rPr lang="fr-FR" dirty="0"/>
-              <a:t> a user id to </a:t>
-            </a:r>
-            <a:r>
-              <a:rPr lang="fr-FR" dirty="0" err="1"/>
-              <a:t>obtain</a:t>
-            </a:r>
-            <a:r>
-              <a:rPr lang="fr-FR" dirty="0"/>
-              <a:t> a recommandation</a:t>
-            </a:r>
-            <a:r>
-              <a:rPr lang="en-US" dirty="0"/>
-              <a:t>"</a:t>
-            </a:r>
-            <a:endParaRPr lang="fr-FR" dirty="0"/>
-          </a:p>
-          <a:p>
-            <a:r>
-              <a:rPr lang="fr-FR" dirty="0" err="1"/>
-              <a:t>User_id</a:t>
-            </a:r>
-            <a:r>
-              <a:rPr lang="fr-FR" dirty="0"/>
-              <a:t> non reconnue :</a:t>
-            </a:r>
-          </a:p>
-          <a:p>
-            <a:pPr lvl="1"/>
-            <a:r>
-              <a:rPr lang="en-US" dirty="0"/>
-              <a:t>"Found no user with this id"</a:t>
-            </a:r>
-            <a:endParaRPr lang="fr-FR" dirty="0"/>
-          </a:p>
-          <a:p>
-            <a:r>
-              <a:rPr lang="fr-FR" dirty="0" err="1"/>
-              <a:t>User_id</a:t>
-            </a:r>
-            <a:r>
-              <a:rPr lang="fr-FR" dirty="0"/>
-              <a:t> reconnue</a:t>
-            </a:r>
-          </a:p>
-          <a:p>
-            <a:pPr lvl="1"/>
-            <a:r>
-              <a:rPr lang="fr-FR" dirty="0"/>
-              <a:t>Récupération des 5 meilleurs articles et calcul de l’article moyen</a:t>
-            </a:r>
-          </a:p>
-          <a:p>
-            <a:pPr lvl="1"/>
-            <a:r>
-              <a:rPr lang="fr-FR" dirty="0"/>
-              <a:t>Calcul des similarités</a:t>
-            </a:r>
-          </a:p>
-          <a:p>
-            <a:pPr lvl="1"/>
-            <a:endParaRPr lang="fr-FR" dirty="0"/>
-          </a:p>
-          <a:p>
-            <a:pPr lvl="1"/>
-            <a:endParaRPr lang="fr-FR" dirty="0"/>
-          </a:p>
-        </p:txBody>
-      </p:sp>
-    </p:spTree>
-    <p:extLst>
-      <p:ext uri="{BB962C8B-B14F-4D97-AF65-F5344CB8AC3E}">
-        <p14:creationId xmlns:p14="http://schemas.microsoft.com/office/powerpoint/2010/main" val="1638264871"/>
-      </p:ext>
-    </p:extLst>
-  </p:cSld>
-  <p:clrMapOvr>
-    <a:masterClrMapping/>
-  </p:clrMapOvr>
-</p:sld>
-</file>
-
-<file path=ppt/slides/slide12.xml><?xml version="1.0" encoding="utf-8"?>
-<p:sld xmlns:a="http://schemas.openxmlformats.org/drawingml/2006/main" xmlns:r="http://schemas.openxmlformats.org/officeDocument/2006/relationships" xmlns:p="http://schemas.openxmlformats.org/presentationml/2006/main">
-  <p:cSld>
-    <p:spTree>
-      <p:nvGrpSpPr>
-        <p:cNvPr id="1" name=""/>
-        <p:cNvGrpSpPr/>
-        <p:nvPr/>
-      </p:nvGrpSpPr>
-      <p:grpSpPr>
-        <a:xfrm>
-          <a:off x="0" y="0"/>
-          <a:ext cx="0" cy="0"/>
-          <a:chOff x="0" y="0"/>
-          <a:chExt cx="0" cy="0"/>
-        </a:xfrm>
-      </p:grpSpPr>
-      <p:sp>
-        <p:nvSpPr>
-          <p:cNvPr id="2" name="Titre 1">
-            <a:extLst>
-              <a:ext uri="{FF2B5EF4-FFF2-40B4-BE49-F238E27FC236}">
-                <a16:creationId xmlns:a16="http://schemas.microsoft.com/office/drawing/2014/main" id="{7A4919D0-F177-4BBA-9A0B-DBA69E2ED764}"/>
-              </a:ext>
-            </a:extLst>
-          </p:cNvPr>
-          <p:cNvSpPr>
-            <a:spLocks noGrp="1"/>
-          </p:cNvSpPr>
-          <p:nvPr>
-            <p:ph type="title"/>
-          </p:nvPr>
-        </p:nvSpPr>
-        <p:spPr>
-          <a:xfrm>
-            <a:off x="1066800" y="642594"/>
-            <a:ext cx="10058400" cy="1371600"/>
-          </a:xfrm>
-        </p:spPr>
-        <p:txBody>
-          <a:bodyPr rtlCol="0">
-            <a:normAutofit/>
-          </a:bodyPr>
-          <a:lstStyle/>
-          <a:p>
-            <a:pPr algn="ctr" rtl="0"/>
-            <a:r>
               <a:rPr lang="fr"/>
               <a:t>III. Application Test</a:t>
             </a:r>
@@ -22939,7 +22215,7 @@
           <p:nvPr>
             <p:extLst>
               <p:ext uri="{D42A27DB-BD31-4B8C-83A1-F6EECF244321}">
-                <p14:modId xmlns:p14="http://schemas.microsoft.com/office/powerpoint/2010/main" val="3390817326"/>
+                <p14:modId xmlns:p14="http://schemas.microsoft.com/office/powerpoint/2010/main" val="3312812578"/>
               </p:ext>
             </p:extLst>
           </p:nvPr>
@@ -22967,7 +22243,7 @@
 </p:sld>
 </file>
 
-<file path=ppt/slides/slide13.xml><?xml version="1.0" encoding="utf-8"?>
+<file path=ppt/slides/slide12.xml><?xml version="1.0" encoding="utf-8"?>
 <p:sld xmlns:a="http://schemas.openxmlformats.org/drawingml/2006/main" xmlns:r="http://schemas.openxmlformats.org/officeDocument/2006/relationships" xmlns:p="http://schemas.openxmlformats.org/presentationml/2006/main">
   <p:cSld>
     <p:spTree>
@@ -23092,7 +22368,7 @@
                   <a:spcPts val="600"/>
                 </a:spcAft>
               </a:pPr>
-              <a:t>29/11/2022</a:t>
+              <a:t>30/11/2022</a:t>
             </a:fld>
             <a:endParaRPr lang="en-US"/>
           </a:p>
@@ -23111,7 +22387,7 @@
 </p:sld>
 </file>
 
-<file path=ppt/slides/slide14.xml><?xml version="1.0" encoding="utf-8"?>
+<file path=ppt/slides/slide13.xml><?xml version="1.0" encoding="utf-8"?>
 <p:sld xmlns:a="http://schemas.openxmlformats.org/drawingml/2006/main" xmlns:r="http://schemas.openxmlformats.org/officeDocument/2006/relationships" xmlns:p="http://schemas.openxmlformats.org/presentationml/2006/main">
   <p:cSld>
     <p:spTree>
@@ -24456,7 +23732,7 @@
                   <a:spcPts val="600"/>
                 </a:spcAft>
               </a:pPr>
-              <a:t>29/11/2022</a:t>
+              <a:t>30/11/2022</a:t>
             </a:fld>
             <a:endParaRPr lang="en-US"/>
           </a:p>
@@ -24707,7 +23983,7 @@
                   <a:spcPts val="600"/>
                 </a:spcAft>
               </a:pPr>
-              <a:t>29/11/2022</a:t>
+              <a:t>30/11/2022</a:t>
             </a:fld>
             <a:endParaRPr lang="en-US"/>
           </a:p>
@@ -26167,7 +25443,7 @@
                   <a:spcPts val="600"/>
                 </a:spcAft>
               </a:pPr>
-              <a:t>29/11/2022</a:t>
+              <a:t>30/11/2022</a:t>
             </a:fld>
             <a:endParaRPr lang="en-US"/>
           </a:p>

</xml_diff>